<commit_message>
Presentation: Removed a bullet point in the Agenda
</commit_message>
<xml_diff>
--- a/I’ve got an Idea.pptx
+++ b/I’ve got an Idea.pptx
@@ -3487,24 +3487,25 @@
             <a:pPr lvl="1"/>
             <a:r>
               <a:rPr lang="da-DK" dirty="0" smtClean="0"/>
-              <a:t>The IDEA </a:t>
+              <a:t>The </a:t>
+            </a:r>
+            <a:r>
+              <a:rPr lang="da-DK" smtClean="0"/>
+              <a:t>IDEA </a:t>
+            </a:r>
+            <a:r>
+              <a:rPr lang="da-DK" smtClean="0"/>
+              <a:t>platform</a:t>
+            </a:r>
+          </a:p>
+          <a:p>
+            <a:r>
+              <a:rPr lang="da-DK" smtClean="0"/>
+              <a:t>The </a:t>
             </a:r>
             <a:r>
               <a:rPr lang="da-DK" dirty="0" smtClean="0"/>
-              <a:t>platform</a:t>
-            </a:r>
-          </a:p>
-          <a:p>
-            <a:r>
-              <a:rPr lang="da-DK" dirty="0" smtClean="0"/>
-              <a:t>Quick introduction to the commands</a:t>
-            </a:r>
-            <a:endParaRPr lang="da-DK" dirty="0"/>
-          </a:p>
-          <a:p>
-            <a:r>
-              <a:rPr lang="da-DK" dirty="0" smtClean="0"/>
-              <a:t>The exercises</a:t>
+              <a:t>exercises</a:t>
             </a:r>
             <a:endParaRPr lang="da-DK" dirty="0"/>
           </a:p>
@@ -4610,7 +4611,7 @@
         <p:spPr>
           <a:xfrm>
             <a:off x="7251590" y="2550180"/>
-            <a:ext cx="4023360" cy="1292662"/>
+            <a:ext cx="4023360" cy="1323439"/>
           </a:xfrm>
           <a:prstGeom prst="rect">
             <a:avLst/>
@@ -4624,7 +4625,7 @@
           <a:lstStyle/>
           <a:p>
             <a:r>
-              <a:rPr lang="da-DK" dirty="0" smtClean="0"/>
+              <a:rPr lang="da-DK" sz="2000" b="1" dirty="0" smtClean="0"/>
               <a:t>A simple drawing framework</a:t>
             </a:r>
           </a:p>

</xml_diff>